<commit_message>
fix readme & usage
</commit_message>
<xml_diff>
--- a/doc/parameters.pptx
+++ b/doc/parameters.pptx
@@ -243,7 +243,7 @@
           <a:p>
             <a:fld id="{FF257081-AE00-704A-9D8C-BAAF72933692}" type="datetimeFigureOut">
               <a:rPr kumimoji="1" lang="zh-CN" altLang="en-US" smtClean="0"/>
-              <a:t>2021/2/3</a:t>
+              <a:t>2021/3/12</a:t>
             </a:fld>
             <a:endParaRPr kumimoji="1" lang="zh-CN" altLang="en-US"/>
           </a:p>
@@ -408,7 +408,7 @@
           <a:p>
             <a:fld id="{FF257081-AE00-704A-9D8C-BAAF72933692}" type="datetimeFigureOut">
               <a:rPr kumimoji="1" lang="zh-CN" altLang="en-US" smtClean="0"/>
-              <a:t>2021/2/3</a:t>
+              <a:t>2021/3/12</a:t>
             </a:fld>
             <a:endParaRPr kumimoji="1" lang="zh-CN" altLang="en-US"/>
           </a:p>
@@ -583,7 +583,7 @@
           <a:p>
             <a:fld id="{FF257081-AE00-704A-9D8C-BAAF72933692}" type="datetimeFigureOut">
               <a:rPr kumimoji="1" lang="zh-CN" altLang="en-US" smtClean="0"/>
-              <a:t>2021/2/3</a:t>
+              <a:t>2021/3/12</a:t>
             </a:fld>
             <a:endParaRPr kumimoji="1" lang="zh-CN" altLang="en-US"/>
           </a:p>
@@ -748,7 +748,7 @@
           <a:p>
             <a:fld id="{FF257081-AE00-704A-9D8C-BAAF72933692}" type="datetimeFigureOut">
               <a:rPr kumimoji="1" lang="zh-CN" altLang="en-US" smtClean="0"/>
-              <a:t>2021/2/3</a:t>
+              <a:t>2021/3/12</a:t>
             </a:fld>
             <a:endParaRPr kumimoji="1" lang="zh-CN" altLang="en-US"/>
           </a:p>
@@ -987,7 +987,7 @@
           <a:p>
             <a:fld id="{FF257081-AE00-704A-9D8C-BAAF72933692}" type="datetimeFigureOut">
               <a:rPr kumimoji="1" lang="zh-CN" altLang="en-US" smtClean="0"/>
-              <a:t>2021/2/3</a:t>
+              <a:t>2021/3/12</a:t>
             </a:fld>
             <a:endParaRPr kumimoji="1" lang="zh-CN" altLang="en-US"/>
           </a:p>
@@ -1214,7 +1214,7 @@
           <a:p>
             <a:fld id="{FF257081-AE00-704A-9D8C-BAAF72933692}" type="datetimeFigureOut">
               <a:rPr kumimoji="1" lang="zh-CN" altLang="en-US" smtClean="0"/>
-              <a:t>2021/2/3</a:t>
+              <a:t>2021/3/12</a:t>
             </a:fld>
             <a:endParaRPr kumimoji="1" lang="zh-CN" altLang="en-US"/>
           </a:p>
@@ -1576,7 +1576,7 @@
           <a:p>
             <a:fld id="{FF257081-AE00-704A-9D8C-BAAF72933692}" type="datetimeFigureOut">
               <a:rPr kumimoji="1" lang="zh-CN" altLang="en-US" smtClean="0"/>
-              <a:t>2021/2/3</a:t>
+              <a:t>2021/3/12</a:t>
             </a:fld>
             <a:endParaRPr kumimoji="1" lang="zh-CN" altLang="en-US"/>
           </a:p>
@@ -1689,7 +1689,7 @@
           <a:p>
             <a:fld id="{FF257081-AE00-704A-9D8C-BAAF72933692}" type="datetimeFigureOut">
               <a:rPr kumimoji="1" lang="zh-CN" altLang="en-US" smtClean="0"/>
-              <a:t>2021/2/3</a:t>
+              <a:t>2021/3/12</a:t>
             </a:fld>
             <a:endParaRPr kumimoji="1" lang="zh-CN" altLang="en-US"/>
           </a:p>
@@ -1779,7 +1779,7 @@
           <a:p>
             <a:fld id="{FF257081-AE00-704A-9D8C-BAAF72933692}" type="datetimeFigureOut">
               <a:rPr kumimoji="1" lang="zh-CN" altLang="en-US" smtClean="0"/>
-              <a:t>2021/2/3</a:t>
+              <a:t>2021/3/12</a:t>
             </a:fld>
             <a:endParaRPr kumimoji="1" lang="zh-CN" altLang="en-US"/>
           </a:p>
@@ -2051,7 +2051,7 @@
           <a:p>
             <a:fld id="{FF257081-AE00-704A-9D8C-BAAF72933692}" type="datetimeFigureOut">
               <a:rPr kumimoji="1" lang="zh-CN" altLang="en-US" smtClean="0"/>
-              <a:t>2021/2/3</a:t>
+              <a:t>2021/3/12</a:t>
             </a:fld>
             <a:endParaRPr kumimoji="1" lang="zh-CN" altLang="en-US"/>
           </a:p>
@@ -2303,7 +2303,7 @@
           <a:p>
             <a:fld id="{FF257081-AE00-704A-9D8C-BAAF72933692}" type="datetimeFigureOut">
               <a:rPr kumimoji="1" lang="zh-CN" altLang="en-US" smtClean="0"/>
-              <a:t>2021/2/3</a:t>
+              <a:t>2021/3/12</a:t>
             </a:fld>
             <a:endParaRPr kumimoji="1" lang="zh-CN" altLang="en-US"/>
           </a:p>
@@ -2511,7 +2511,7 @@
           <a:p>
             <a:fld id="{FF257081-AE00-704A-9D8C-BAAF72933692}" type="datetimeFigureOut">
               <a:rPr kumimoji="1" lang="zh-CN" altLang="en-US" smtClean="0"/>
-              <a:t>2021/2/3</a:t>
+              <a:t>2021/3/12</a:t>
             </a:fld>
             <a:endParaRPr kumimoji="1" lang="zh-CN" altLang="en-US"/>
           </a:p>
@@ -4436,8 +4436,8 @@
           </a:fontRef>
         </p:style>
       </p:cxnSp>
-      <mc:AlternateContent xmlns:mc="http://schemas.openxmlformats.org/markup-compatibility/2006" xmlns:a14="http://schemas.microsoft.com/office/drawing/2010/main">
-        <mc:Choice Requires="a14">
+      <mc:AlternateContent xmlns:mc="http://schemas.openxmlformats.org/markup-compatibility/2006">
+        <mc:Choice xmlns:a14="http://schemas.microsoft.com/office/drawing/2010/main" Requires="a14">
           <p:sp>
             <p:nvSpPr>
               <p:cNvPr id="30" name="文本框 29"/>
@@ -4530,7 +4530,7 @@
                 </a14:m>
                 <a:r>
                   <a:rPr kumimoji="1" lang="zh-CN" altLang="en-US" dirty="0"/>
-                  <a:t>代表重</a:t>
+                  <a:t>代表从</a:t>
                 </a:r>
                 <a:r>
                   <a:rPr kumimoji="1" lang="en-US" altLang="zh-CN" dirty="0"/>
@@ -4592,12 +4592,12 @@
             </p:txBody>
           </p:sp>
         </mc:Choice>
-        <mc:Fallback xmlns="">
+        <mc:Fallback>
           <p:sp>
             <p:nvSpPr>
               <p:cNvPr id="30" name="文本框 29"/>
-              <p:cNvSpPr txBox="true">
-                <a:spLocks noRot="true" noChangeAspect="true" noMove="true" noResize="true" noEditPoints="true" noAdjustHandles="true" noChangeArrowheads="true" noChangeShapeType="true" noTextEdit="true"/>
+              <p:cNvSpPr txBox="1">
+                <a:spLocks noRot="1" noChangeAspect="1" noMove="1" noResize="1" noEditPoints="1" noAdjustHandles="1" noChangeArrowheads="1" noChangeShapeType="1" noTextEdit="1"/>
               </p:cNvSpPr>
               <p:nvPr/>
             </p:nvSpPr>
@@ -4609,10 +4609,10 @@
               <a:prstGeom prst="rect">
                 <a:avLst/>
               </a:prstGeom>
-              <a:blipFill rotWithShape="true">
+              <a:blipFill>
                 <a:blip r:embed="rId7"/>
                 <a:stretch>
-                  <a:fillRect l="-9" t="-33" r="7" b="48"/>
+                  <a:fillRect l="-1445" t="-2488" r="-161" b="-6965"/>
                 </a:stretch>
               </a:blipFill>
             </p:spPr>

</xml_diff>